<commit_message>
bug in ppt title the reflected pdf title in web
</commit_message>
<xml_diff>
--- a/c_07_camera_calibration/camera_calibration.pptx
+++ b/c_07_camera_calibration/camera_calibration.pptx
@@ -247,7 +247,7 @@
           <a:p>
             <a:fld id="{EF8443A9-F23A-48DF-A7F1-69ACC1B2952D}" type="datetimeFigureOut">
               <a:rPr lang="en-US" smtClean="0"/>
-              <a:t>18-Dec-19</a:t>
+              <a:t>28-Dec-19</a:t>
             </a:fld>
             <a:endParaRPr lang="en-US"/>
           </a:p>
@@ -5020,7 +5020,7 @@
           <a:p>
             <a:fld id="{1930E4BE-DC49-4C06-9EAD-5C882F80E0B2}" type="datetimeFigureOut">
               <a:rPr lang="en-US" smtClean="0"/>
-              <a:t>18-Dec-19</a:t>
+              <a:t>28-Dec-19</a:t>
             </a:fld>
             <a:endParaRPr lang="en-US"/>
           </a:p>
@@ -5198,7 +5198,7 @@
           <a:p>
             <a:fld id="{1930E4BE-DC49-4C06-9EAD-5C882F80E0B2}" type="datetimeFigureOut">
               <a:rPr lang="en-US" smtClean="0"/>
-              <a:t>18-Dec-19</a:t>
+              <a:t>28-Dec-19</a:t>
             </a:fld>
             <a:endParaRPr lang="en-US"/>
           </a:p>
@@ -5497,7 +5497,7 @@
           <a:p>
             <a:fld id="{1930E4BE-DC49-4C06-9EAD-5C882F80E0B2}" type="datetimeFigureOut">
               <a:rPr lang="en-US" smtClean="0"/>
-              <a:t>18-Dec-19</a:t>
+              <a:t>28-Dec-19</a:t>
             </a:fld>
             <a:endParaRPr lang="en-US"/>
           </a:p>
@@ -5742,7 +5742,7 @@
           <a:p>
             <a:fld id="{1930E4BE-DC49-4C06-9EAD-5C882F80E0B2}" type="datetimeFigureOut">
               <a:rPr lang="en-US" smtClean="0"/>
-              <a:t>18-Dec-19</a:t>
+              <a:t>28-Dec-19</a:t>
             </a:fld>
             <a:endParaRPr lang="en-US"/>
           </a:p>
@@ -6027,7 +6027,7 @@
           <a:p>
             <a:fld id="{1930E4BE-DC49-4C06-9EAD-5C882F80E0B2}" type="datetimeFigureOut">
               <a:rPr lang="en-US" smtClean="0"/>
-              <a:t>18-Dec-19</a:t>
+              <a:t>28-Dec-19</a:t>
             </a:fld>
             <a:endParaRPr lang="en-US"/>
           </a:p>
@@ -6446,7 +6446,7 @@
           <a:p>
             <a:fld id="{1930E4BE-DC49-4C06-9EAD-5C882F80E0B2}" type="datetimeFigureOut">
               <a:rPr lang="en-US" smtClean="0"/>
-              <a:t>18-Dec-19</a:t>
+              <a:t>28-Dec-19</a:t>
             </a:fld>
             <a:endParaRPr lang="en-US"/>
           </a:p>
@@ -6563,7 +6563,7 @@
           <a:p>
             <a:fld id="{1930E4BE-DC49-4C06-9EAD-5C882F80E0B2}" type="datetimeFigureOut">
               <a:rPr lang="en-US" smtClean="0"/>
-              <a:t>18-Dec-19</a:t>
+              <a:t>28-Dec-19</a:t>
             </a:fld>
             <a:endParaRPr lang="en-US"/>
           </a:p>
@@ -6658,7 +6658,7 @@
           <a:p>
             <a:fld id="{1930E4BE-DC49-4C06-9EAD-5C882F80E0B2}" type="datetimeFigureOut">
               <a:rPr lang="en-US" smtClean="0"/>
-              <a:t>18-Dec-19</a:t>
+              <a:t>28-Dec-19</a:t>
             </a:fld>
             <a:endParaRPr lang="en-US"/>
           </a:p>
@@ -6933,7 +6933,7 @@
           <a:p>
             <a:fld id="{1930E4BE-DC49-4C06-9EAD-5C882F80E0B2}" type="datetimeFigureOut">
               <a:rPr lang="en-US" smtClean="0"/>
-              <a:t>18-Dec-19</a:t>
+              <a:t>28-Dec-19</a:t>
             </a:fld>
             <a:endParaRPr lang="en-US"/>
           </a:p>
@@ -7185,7 +7185,7 @@
           <a:p>
             <a:fld id="{1930E4BE-DC49-4C06-9EAD-5C882F80E0B2}" type="datetimeFigureOut">
               <a:rPr lang="en-US" smtClean="0"/>
-              <a:t>18-Dec-19</a:t>
+              <a:t>28-Dec-19</a:t>
             </a:fld>
             <a:endParaRPr lang="en-US"/>
           </a:p>
@@ -7396,7 +7396,7 @@
           <a:p>
             <a:fld id="{1930E4BE-DC49-4C06-9EAD-5C882F80E0B2}" type="datetimeFigureOut">
               <a:rPr lang="en-US" smtClean="0"/>
-              <a:t>18-Dec-19</a:t>
+              <a:t>28-Dec-19</a:t>
             </a:fld>
             <a:endParaRPr lang="en-US"/>
           </a:p>
@@ -8087,8 +8087,8 @@
           </a:p>
         </p:txBody>
       </p:sp>
-      <mc:AlternateContent xmlns:mc="http://schemas.openxmlformats.org/markup-compatibility/2006">
-        <mc:Choice xmlns:a14="http://schemas.microsoft.com/office/drawing/2010/main" Requires="a14">
+      <mc:AlternateContent xmlns:mc="http://schemas.openxmlformats.org/markup-compatibility/2006" xmlns:a14="http://schemas.microsoft.com/office/drawing/2010/main">
+        <mc:Choice Requires="a14">
           <p:sp>
             <p:nvSpPr>
               <p:cNvPr id="3" name="Content Placeholder 2"/>
@@ -8156,7 +8156,7 @@
             </p:txBody>
           </p:sp>
         </mc:Choice>
-        <mc:Fallback>
+        <mc:Fallback xmlns="">
           <p:sp>
             <p:nvSpPr>
               <p:cNvPr id="3" name="Content Placeholder 2"/>
@@ -8392,8 +8392,8 @@
           </a:p>
         </p:txBody>
       </p:sp>
-      <mc:AlternateContent xmlns:mc="http://schemas.openxmlformats.org/markup-compatibility/2006">
-        <mc:Choice xmlns:a14="http://schemas.microsoft.com/office/drawing/2010/main" Requires="a14">
+      <mc:AlternateContent xmlns:mc="http://schemas.openxmlformats.org/markup-compatibility/2006" xmlns:a14="http://schemas.microsoft.com/office/drawing/2010/main">
+        <mc:Choice Requires="a14">
           <p:sp>
             <p:nvSpPr>
               <p:cNvPr id="25" name="TextBox 24">
@@ -8422,6 +8422,7 @@
               </a:bodyPr>
               <a:lstStyle/>
               <a:p>
+                <a:pPr/>
                 <a14:m>
                   <m:oMathPara xmlns:m="http://schemas.openxmlformats.org/officeDocument/2006/math">
                     <m:oMathParaPr>
@@ -8461,7 +8462,7 @@
             </p:txBody>
           </p:sp>
         </mc:Choice>
-        <mc:Fallback>
+        <mc:Fallback xmlns="">
           <p:sp>
             <p:nvSpPr>
               <p:cNvPr id="25" name="TextBox 24">
@@ -8558,8 +8559,8 @@
           </a:p>
         </p:txBody>
       </p:sp>
-      <mc:AlternateContent xmlns:mc="http://schemas.openxmlformats.org/markup-compatibility/2006">
-        <mc:Choice xmlns:a14="http://schemas.microsoft.com/office/drawing/2010/main" Requires="a14">
+      <mc:AlternateContent xmlns:mc="http://schemas.openxmlformats.org/markup-compatibility/2006" xmlns:a14="http://schemas.microsoft.com/office/drawing/2010/main">
+        <mc:Choice Requires="a14">
           <p:sp>
             <p:nvSpPr>
               <p:cNvPr id="3" name="Content Placeholder 2"/>
@@ -8627,7 +8628,7 @@
             </p:txBody>
           </p:sp>
         </mc:Choice>
-        <mc:Fallback>
+        <mc:Fallback xmlns="">
           <p:sp>
             <p:nvSpPr>
               <p:cNvPr id="3" name="Content Placeholder 2"/>
@@ -9009,8 +9010,8 @@
           </a:p>
         </p:txBody>
       </p:sp>
-      <mc:AlternateContent xmlns:mc="http://schemas.openxmlformats.org/markup-compatibility/2006">
-        <mc:Choice xmlns:a14="http://schemas.microsoft.com/office/drawing/2010/main" Requires="a14">
+      <mc:AlternateContent xmlns:mc="http://schemas.openxmlformats.org/markup-compatibility/2006" xmlns:a14="http://schemas.microsoft.com/office/drawing/2010/main">
+        <mc:Choice Requires="a14">
           <p:sp>
             <p:nvSpPr>
               <p:cNvPr id="25" name="TextBox 24">
@@ -9039,6 +9040,7 @@
               </a:bodyPr>
               <a:lstStyle/>
               <a:p>
+                <a:pPr/>
                 <a14:m>
                   <m:oMathPara xmlns:m="http://schemas.openxmlformats.org/officeDocument/2006/math">
                     <m:oMathParaPr>
@@ -9078,7 +9080,7 @@
             </p:txBody>
           </p:sp>
         </mc:Choice>
-        <mc:Fallback>
+        <mc:Fallback xmlns="">
           <p:sp>
             <p:nvSpPr>
               <p:cNvPr id="25" name="TextBox 24">
@@ -9613,7 +9615,7 @@
           </a:ln>
           <a:extLst>
             <a:ext uri="{C572A759-6A51-4108-AA02-DFA0A04FC94B}">
-              <ma14:wrappingTextBoxFlag xmlns:ma14="http://schemas.microsoft.com/office/mac/drawingml/2011/main" xmlns="" val="1"/>
+              <ma14:wrappingTextBoxFlag xmlns="" xmlns:ma14="http://schemas.microsoft.com/office/mac/drawingml/2011/main" val="1"/>
             </a:ext>
           </a:extLst>
         </p:spPr>
@@ -9650,8 +9652,8 @@
           </a:p>
         </p:txBody>
       </p:sp>
-      <mc:AlternateContent xmlns:mc="http://schemas.openxmlformats.org/markup-compatibility/2006">
-        <mc:Choice xmlns:a14="http://schemas.microsoft.com/office/drawing/2010/main" Requires="a14">
+      <mc:AlternateContent xmlns:mc="http://schemas.openxmlformats.org/markup-compatibility/2006" xmlns:a14="http://schemas.microsoft.com/office/drawing/2010/main">
+        <mc:Choice Requires="a14">
           <p:sp>
             <p:nvSpPr>
               <p:cNvPr id="24" name="TextBox 23">
@@ -9711,7 +9713,7 @@
             </p:txBody>
           </p:sp>
         </mc:Choice>
-        <mc:Fallback>
+        <mc:Fallback xmlns="">
           <p:sp>
             <p:nvSpPr>
               <p:cNvPr id="24" name="TextBox 23">
@@ -9756,8 +9758,8 @@
           </p:sp>
         </mc:Fallback>
       </mc:AlternateContent>
-      <mc:AlternateContent xmlns:mc="http://schemas.openxmlformats.org/markup-compatibility/2006">
-        <mc:Choice xmlns:a14="http://schemas.microsoft.com/office/drawing/2010/main" Requires="a14">
+      <mc:AlternateContent xmlns:mc="http://schemas.openxmlformats.org/markup-compatibility/2006" xmlns:a14="http://schemas.microsoft.com/office/drawing/2010/main">
+        <mc:Choice Requires="a14">
           <p:sp>
             <p:nvSpPr>
               <p:cNvPr id="25" name="TextBox 24">
@@ -9786,6 +9788,7 @@
               </a:bodyPr>
               <a:lstStyle/>
               <a:p>
+                <a:pPr/>
                 <a14:m>
                   <m:oMathPara xmlns:m="http://schemas.openxmlformats.org/officeDocument/2006/math">
                     <m:oMathParaPr>
@@ -9825,7 +9828,7 @@
             </p:txBody>
           </p:sp>
         </mc:Choice>
-        <mc:Fallback>
+        <mc:Fallback xmlns="">
           <p:sp>
             <p:nvSpPr>
               <p:cNvPr id="25" name="TextBox 24">
@@ -10360,7 +10363,7 @@
           </a:ln>
           <a:extLst>
             <a:ext uri="{C572A759-6A51-4108-AA02-DFA0A04FC94B}">
-              <ma14:wrappingTextBoxFlag xmlns:ma14="http://schemas.microsoft.com/office/mac/drawingml/2011/main" xmlns="" val="1"/>
+              <ma14:wrappingTextBoxFlag xmlns="" xmlns:ma14="http://schemas.microsoft.com/office/mac/drawingml/2011/main" val="1"/>
             </a:ext>
           </a:extLst>
         </p:spPr>
@@ -10397,8 +10400,8 @@
           </a:p>
         </p:txBody>
       </p:sp>
-      <mc:AlternateContent xmlns:mc="http://schemas.openxmlformats.org/markup-compatibility/2006">
-        <mc:Choice xmlns:a14="http://schemas.microsoft.com/office/drawing/2010/main" Requires="a14">
+      <mc:AlternateContent xmlns:mc="http://schemas.openxmlformats.org/markup-compatibility/2006" xmlns:a14="http://schemas.microsoft.com/office/drawing/2010/main">
+        <mc:Choice Requires="a14">
           <p:sp>
             <p:nvSpPr>
               <p:cNvPr id="24" name="TextBox 23">
@@ -10458,7 +10461,7 @@
             </p:txBody>
           </p:sp>
         </mc:Choice>
-        <mc:Fallback>
+        <mc:Fallback xmlns="">
           <p:sp>
             <p:nvSpPr>
               <p:cNvPr id="24" name="TextBox 23">
@@ -10503,8 +10506,8 @@
           </p:sp>
         </mc:Fallback>
       </mc:AlternateContent>
-      <mc:AlternateContent xmlns:mc="http://schemas.openxmlformats.org/markup-compatibility/2006">
-        <mc:Choice xmlns:a14="http://schemas.microsoft.com/office/drawing/2010/main" Requires="a14">
+      <mc:AlternateContent xmlns:mc="http://schemas.openxmlformats.org/markup-compatibility/2006" xmlns:a14="http://schemas.microsoft.com/office/drawing/2010/main">
+        <mc:Choice Requires="a14">
           <p:sp>
             <p:nvSpPr>
               <p:cNvPr id="25" name="TextBox 24">
@@ -10533,6 +10536,7 @@
               </a:bodyPr>
               <a:lstStyle/>
               <a:p>
+                <a:pPr/>
                 <a14:m>
                   <m:oMathPara xmlns:m="http://schemas.openxmlformats.org/officeDocument/2006/math">
                     <m:oMathParaPr>
@@ -10572,7 +10576,7 @@
             </p:txBody>
           </p:sp>
         </mc:Choice>
-        <mc:Fallback>
+        <mc:Fallback xmlns="">
           <p:sp>
             <p:nvSpPr>
               <p:cNvPr id="25" name="TextBox 24">
@@ -10712,8 +10716,8 @@
           </a:p>
         </p:txBody>
       </p:sp>
-      <mc:AlternateContent xmlns:mc="http://schemas.openxmlformats.org/markup-compatibility/2006">
-        <mc:Choice xmlns:a14="http://schemas.microsoft.com/office/drawing/2010/main" Requires="a14">
+      <mc:AlternateContent xmlns:mc="http://schemas.openxmlformats.org/markup-compatibility/2006" xmlns:a14="http://schemas.microsoft.com/office/drawing/2010/main">
+        <mc:Choice Requires="a14">
           <p:sp>
             <p:nvSpPr>
               <p:cNvPr id="28" name="TextBox 27">
@@ -10742,6 +10746,7 @@
               </a:bodyPr>
               <a:lstStyle/>
               <a:p>
+                <a:pPr/>
                 <a14:m>
                   <m:oMathPara xmlns:m="http://schemas.openxmlformats.org/officeDocument/2006/math">
                     <m:oMathParaPr>
@@ -10793,7 +10798,7 @@
             </p:txBody>
           </p:sp>
         </mc:Choice>
-        <mc:Fallback>
+        <mc:Fallback xmlns="">
           <p:sp>
             <p:nvSpPr>
               <p:cNvPr id="28" name="TextBox 27">
@@ -10838,8 +10843,8 @@
           </p:sp>
         </mc:Fallback>
       </mc:AlternateContent>
-      <mc:AlternateContent xmlns:mc="http://schemas.openxmlformats.org/markup-compatibility/2006">
-        <mc:Choice xmlns:a14="http://schemas.microsoft.com/office/drawing/2010/main" Requires="a14">
+      <mc:AlternateContent xmlns:mc="http://schemas.openxmlformats.org/markup-compatibility/2006" xmlns:a14="http://schemas.microsoft.com/office/drawing/2010/main">
+        <mc:Choice Requires="a14">
           <p:sp>
             <p:nvSpPr>
               <p:cNvPr id="32" name="TextBox 31">
@@ -10908,7 +10913,7 @@
             </p:txBody>
           </p:sp>
         </mc:Choice>
-        <mc:Fallback>
+        <mc:Fallback xmlns="">
           <p:sp>
             <p:nvSpPr>
               <p:cNvPr id="32" name="TextBox 31">
@@ -11005,8 +11010,8 @@
           </a:p>
         </p:txBody>
       </p:sp>
-      <mc:AlternateContent xmlns:mc="http://schemas.openxmlformats.org/markup-compatibility/2006">
-        <mc:Choice xmlns:a14="http://schemas.microsoft.com/office/drawing/2010/main" Requires="a14">
+      <mc:AlternateContent xmlns:mc="http://schemas.openxmlformats.org/markup-compatibility/2006" xmlns:a14="http://schemas.microsoft.com/office/drawing/2010/main">
+        <mc:Choice Requires="a14">
           <p:sp>
             <p:nvSpPr>
               <p:cNvPr id="3" name="Content Placeholder 2"/>
@@ -11074,7 +11079,7 @@
             </p:txBody>
           </p:sp>
         </mc:Choice>
-        <mc:Fallback>
+        <mc:Fallback xmlns="">
           <p:sp>
             <p:nvSpPr>
               <p:cNvPr id="3" name="Content Placeholder 2"/>
@@ -11523,7 +11528,7 @@
           </a:ln>
           <a:extLst>
             <a:ext uri="{C572A759-6A51-4108-AA02-DFA0A04FC94B}">
-              <ma14:wrappingTextBoxFlag xmlns:ma14="http://schemas.microsoft.com/office/mac/drawingml/2011/main" xmlns="" val="1"/>
+              <ma14:wrappingTextBoxFlag xmlns="" xmlns:ma14="http://schemas.microsoft.com/office/mac/drawingml/2011/main" val="1"/>
             </a:ext>
           </a:extLst>
         </p:spPr>
@@ -11553,8 +11558,8 @@
           </a:p>
         </p:txBody>
       </p:sp>
-      <mc:AlternateContent xmlns:mc="http://schemas.openxmlformats.org/markup-compatibility/2006">
-        <mc:Choice xmlns:a14="http://schemas.microsoft.com/office/drawing/2010/main" Requires="a14">
+      <mc:AlternateContent xmlns:mc="http://schemas.openxmlformats.org/markup-compatibility/2006" xmlns:a14="http://schemas.microsoft.com/office/drawing/2010/main">
+        <mc:Choice Requires="a14">
           <p:sp>
             <p:nvSpPr>
               <p:cNvPr id="24" name="TextBox 23">
@@ -11614,7 +11619,7 @@
             </p:txBody>
           </p:sp>
         </mc:Choice>
-        <mc:Fallback>
+        <mc:Fallback xmlns="">
           <p:sp>
             <p:nvSpPr>
               <p:cNvPr id="24" name="TextBox 23">
@@ -11659,8 +11664,8 @@
           </p:sp>
         </mc:Fallback>
       </mc:AlternateContent>
-      <mc:AlternateContent xmlns:mc="http://schemas.openxmlformats.org/markup-compatibility/2006">
-        <mc:Choice xmlns:a14="http://schemas.microsoft.com/office/drawing/2010/main" Requires="a14">
+      <mc:AlternateContent xmlns:mc="http://schemas.openxmlformats.org/markup-compatibility/2006" xmlns:a14="http://schemas.microsoft.com/office/drawing/2010/main">
+        <mc:Choice Requires="a14">
           <p:sp>
             <p:nvSpPr>
               <p:cNvPr id="25" name="TextBox 24">
@@ -11689,6 +11694,7 @@
               </a:bodyPr>
               <a:lstStyle/>
               <a:p>
+                <a:pPr/>
                 <a14:m>
                   <m:oMathPara xmlns:m="http://schemas.openxmlformats.org/officeDocument/2006/math">
                     <m:oMathParaPr>
@@ -11728,7 +11734,7 @@
             </p:txBody>
           </p:sp>
         </mc:Choice>
-        <mc:Fallback>
+        <mc:Fallback xmlns="">
           <p:sp>
             <p:nvSpPr>
               <p:cNvPr id="25" name="TextBox 24">
@@ -11868,8 +11874,8 @@
           </a:p>
         </p:txBody>
       </p:sp>
-      <mc:AlternateContent xmlns:mc="http://schemas.openxmlformats.org/markup-compatibility/2006">
-        <mc:Choice xmlns:a14="http://schemas.microsoft.com/office/drawing/2010/main" Requires="a14">
+      <mc:AlternateContent xmlns:mc="http://schemas.openxmlformats.org/markup-compatibility/2006" xmlns:a14="http://schemas.microsoft.com/office/drawing/2010/main">
+        <mc:Choice Requires="a14">
           <p:sp>
             <p:nvSpPr>
               <p:cNvPr id="28" name="TextBox 27">
@@ -11898,6 +11904,7 @@
               </a:bodyPr>
               <a:lstStyle/>
               <a:p>
+                <a:pPr/>
                 <a14:m>
                   <m:oMathPara xmlns:m="http://schemas.openxmlformats.org/officeDocument/2006/math">
                     <m:oMathParaPr>
@@ -11949,7 +11956,7 @@
             </p:txBody>
           </p:sp>
         </mc:Choice>
-        <mc:Fallback>
+        <mc:Fallback xmlns="">
           <p:sp>
             <p:nvSpPr>
               <p:cNvPr id="28" name="TextBox 27">
@@ -11994,8 +12001,8 @@
           </p:sp>
         </mc:Fallback>
       </mc:AlternateContent>
-      <mc:AlternateContent xmlns:mc="http://schemas.openxmlformats.org/markup-compatibility/2006">
-        <mc:Choice xmlns:a14="http://schemas.microsoft.com/office/drawing/2010/main" Requires="a14">
+      <mc:AlternateContent xmlns:mc="http://schemas.openxmlformats.org/markup-compatibility/2006" xmlns:a14="http://schemas.microsoft.com/office/drawing/2010/main">
+        <mc:Choice Requires="a14">
           <p:sp>
             <p:nvSpPr>
               <p:cNvPr id="32" name="TextBox 31">
@@ -12064,7 +12071,7 @@
             </p:txBody>
           </p:sp>
         </mc:Choice>
-        <mc:Fallback>
+        <mc:Fallback xmlns="">
           <p:sp>
             <p:nvSpPr>
               <p:cNvPr id="32" name="TextBox 31">
@@ -12307,8 +12314,8 @@
           </a:fontRef>
         </p:style>
       </p:cxnSp>
-      <mc:AlternateContent xmlns:mc="http://schemas.openxmlformats.org/markup-compatibility/2006">
-        <mc:Choice xmlns:a14="http://schemas.microsoft.com/office/drawing/2010/main" Requires="a14">
+      <mc:AlternateContent xmlns:mc="http://schemas.openxmlformats.org/markup-compatibility/2006" xmlns:a14="http://schemas.microsoft.com/office/drawing/2010/main">
+        <mc:Choice Requires="a14">
           <p:sp>
             <p:nvSpPr>
               <p:cNvPr id="4" name="Rectangle 3">
@@ -12336,6 +12343,7 @@
               </a:bodyPr>
               <a:lstStyle/>
               <a:p>
+                <a:pPr/>
                 <a14:m>
                   <m:oMathPara xmlns:m="http://schemas.openxmlformats.org/officeDocument/2006/math">
                     <m:oMathParaPr>
@@ -12356,7 +12364,7 @@
             </p:txBody>
           </p:sp>
         </mc:Choice>
-        <mc:Fallback>
+        <mc:Fallback xmlns="">
           <p:sp>
             <p:nvSpPr>
               <p:cNvPr id="4" name="Rectangle 3">
@@ -12453,8 +12461,8 @@
           </a:p>
         </p:txBody>
       </p:sp>
-      <mc:AlternateContent xmlns:mc="http://schemas.openxmlformats.org/markup-compatibility/2006">
-        <mc:Choice xmlns:a14="http://schemas.microsoft.com/office/drawing/2010/main" Requires="a14">
+      <mc:AlternateContent xmlns:mc="http://schemas.openxmlformats.org/markup-compatibility/2006" xmlns:a14="http://schemas.microsoft.com/office/drawing/2010/main">
+        <mc:Choice Requires="a14">
           <p:sp>
             <p:nvSpPr>
               <p:cNvPr id="3" name="Content Placeholder 2"/>
@@ -12522,7 +12530,7 @@
             </p:txBody>
           </p:sp>
         </mc:Choice>
-        <mc:Fallback>
+        <mc:Fallback xmlns="">
           <p:sp>
             <p:nvSpPr>
               <p:cNvPr id="3" name="Content Placeholder 2"/>
@@ -12971,7 +12979,7 @@
           </a:ln>
           <a:extLst>
             <a:ext uri="{C572A759-6A51-4108-AA02-DFA0A04FC94B}">
-              <ma14:wrappingTextBoxFlag xmlns:ma14="http://schemas.microsoft.com/office/mac/drawingml/2011/main" xmlns="" val="1"/>
+              <ma14:wrappingTextBoxFlag xmlns="" xmlns:ma14="http://schemas.microsoft.com/office/mac/drawingml/2011/main" val="1"/>
             </a:ext>
           </a:extLst>
         </p:spPr>
@@ -13008,8 +13016,8 @@
           </a:p>
         </p:txBody>
       </p:sp>
-      <mc:AlternateContent xmlns:mc="http://schemas.openxmlformats.org/markup-compatibility/2006">
-        <mc:Choice xmlns:a14="http://schemas.microsoft.com/office/drawing/2010/main" Requires="a14">
+      <mc:AlternateContent xmlns:mc="http://schemas.openxmlformats.org/markup-compatibility/2006" xmlns:a14="http://schemas.microsoft.com/office/drawing/2010/main">
+        <mc:Choice Requires="a14">
           <p:sp>
             <p:nvSpPr>
               <p:cNvPr id="24" name="TextBox 23">
@@ -13069,7 +13077,7 @@
             </p:txBody>
           </p:sp>
         </mc:Choice>
-        <mc:Fallback>
+        <mc:Fallback xmlns="">
           <p:sp>
             <p:nvSpPr>
               <p:cNvPr id="24" name="TextBox 23">
@@ -13114,8 +13122,8 @@
           </p:sp>
         </mc:Fallback>
       </mc:AlternateContent>
-      <mc:AlternateContent xmlns:mc="http://schemas.openxmlformats.org/markup-compatibility/2006">
-        <mc:Choice xmlns:a14="http://schemas.microsoft.com/office/drawing/2010/main" Requires="a14">
+      <mc:AlternateContent xmlns:mc="http://schemas.openxmlformats.org/markup-compatibility/2006" xmlns:a14="http://schemas.microsoft.com/office/drawing/2010/main">
+        <mc:Choice Requires="a14">
           <p:sp>
             <p:nvSpPr>
               <p:cNvPr id="25" name="TextBox 24">
@@ -13144,6 +13152,7 @@
               </a:bodyPr>
               <a:lstStyle/>
               <a:p>
+                <a:pPr/>
                 <a14:m>
                   <m:oMathPara xmlns:m="http://schemas.openxmlformats.org/officeDocument/2006/math">
                     <m:oMathParaPr>
@@ -13183,7 +13192,7 @@
             </p:txBody>
           </p:sp>
         </mc:Choice>
-        <mc:Fallback>
+        <mc:Fallback xmlns="">
           <p:sp>
             <p:nvSpPr>
               <p:cNvPr id="25" name="TextBox 24">
@@ -13323,8 +13332,8 @@
           </a:p>
         </p:txBody>
       </p:sp>
-      <mc:AlternateContent xmlns:mc="http://schemas.openxmlformats.org/markup-compatibility/2006">
-        <mc:Choice xmlns:a14="http://schemas.microsoft.com/office/drawing/2010/main" Requires="a14">
+      <mc:AlternateContent xmlns:mc="http://schemas.openxmlformats.org/markup-compatibility/2006" xmlns:a14="http://schemas.microsoft.com/office/drawing/2010/main">
+        <mc:Choice Requires="a14">
           <p:sp>
             <p:nvSpPr>
               <p:cNvPr id="28" name="TextBox 27">
@@ -13353,6 +13362,7 @@
               </a:bodyPr>
               <a:lstStyle/>
               <a:p>
+                <a:pPr/>
                 <a14:m>
                   <m:oMathPara xmlns:m="http://schemas.openxmlformats.org/officeDocument/2006/math">
                     <m:oMathParaPr>
@@ -13404,7 +13414,7 @@
             </p:txBody>
           </p:sp>
         </mc:Choice>
-        <mc:Fallback>
+        <mc:Fallback xmlns="">
           <p:sp>
             <p:nvSpPr>
               <p:cNvPr id="28" name="TextBox 27">
@@ -13449,8 +13459,8 @@
           </p:sp>
         </mc:Fallback>
       </mc:AlternateContent>
-      <mc:AlternateContent xmlns:mc="http://schemas.openxmlformats.org/markup-compatibility/2006">
-        <mc:Choice xmlns:a14="http://schemas.microsoft.com/office/drawing/2010/main" Requires="a14">
+      <mc:AlternateContent xmlns:mc="http://schemas.openxmlformats.org/markup-compatibility/2006" xmlns:a14="http://schemas.microsoft.com/office/drawing/2010/main">
+        <mc:Choice Requires="a14">
           <p:sp>
             <p:nvSpPr>
               <p:cNvPr id="32" name="TextBox 31">
@@ -13519,7 +13529,7 @@
             </p:txBody>
           </p:sp>
         </mc:Choice>
-        <mc:Fallback>
+        <mc:Fallback xmlns="">
           <p:sp>
             <p:nvSpPr>
               <p:cNvPr id="32" name="TextBox 31">
@@ -13762,8 +13772,8 @@
           </a:fontRef>
         </p:style>
       </p:cxnSp>
-      <mc:AlternateContent xmlns:mc="http://schemas.openxmlformats.org/markup-compatibility/2006">
-        <mc:Choice xmlns:a14="http://schemas.microsoft.com/office/drawing/2010/main" Requires="a14">
+      <mc:AlternateContent xmlns:mc="http://schemas.openxmlformats.org/markup-compatibility/2006" xmlns:a14="http://schemas.microsoft.com/office/drawing/2010/main">
+        <mc:Choice Requires="a14">
           <p:sp>
             <p:nvSpPr>
               <p:cNvPr id="41" name="TextBox 40">
@@ -13792,6 +13802,7 @@
               </a:bodyPr>
               <a:lstStyle/>
               <a:p>
+                <a:pPr/>
                 <a14:m>
                   <m:oMathPara xmlns:m="http://schemas.openxmlformats.org/officeDocument/2006/math">
                     <m:oMathParaPr>
@@ -13892,7 +13903,7 @@
             </p:txBody>
           </p:sp>
         </mc:Choice>
-        <mc:Fallback>
+        <mc:Fallback xmlns="">
           <p:sp>
             <p:nvSpPr>
               <p:cNvPr id="41" name="TextBox 40">
@@ -13937,8 +13948,8 @@
           </p:sp>
         </mc:Fallback>
       </mc:AlternateContent>
-      <mc:AlternateContent xmlns:mc="http://schemas.openxmlformats.org/markup-compatibility/2006">
-        <mc:Choice xmlns:a14="http://schemas.microsoft.com/office/drawing/2010/main" Requires="a14">
+      <mc:AlternateContent xmlns:mc="http://schemas.openxmlformats.org/markup-compatibility/2006" xmlns:a14="http://schemas.microsoft.com/office/drawing/2010/main">
+        <mc:Choice Requires="a14">
           <p:sp>
             <p:nvSpPr>
               <p:cNvPr id="4" name="Rectangle 3">
@@ -13966,6 +13977,7 @@
               </a:bodyPr>
               <a:lstStyle/>
               <a:p>
+                <a:pPr/>
                 <a14:m>
                   <m:oMathPara xmlns:m="http://schemas.openxmlformats.org/officeDocument/2006/math">
                     <m:oMathParaPr>
@@ -13986,7 +13998,7 @@
             </p:txBody>
           </p:sp>
         </mc:Choice>
-        <mc:Fallback>
+        <mc:Fallback xmlns="">
           <p:sp>
             <p:nvSpPr>
               <p:cNvPr id="4" name="Rectangle 3">
@@ -15602,7 +15614,7 @@
             </a:ln>
             <a:extLst>
               <a:ext uri="{C572A759-6A51-4108-AA02-DFA0A04FC94B}">
-                <ma14:wrappingTextBoxFlag xmlns="" xmlns:ma14="http://schemas.microsoft.com/office/mac/drawingml/2011/main" val="1"/>
+                <ma14:wrappingTextBoxFlag xmlns:ma14="http://schemas.microsoft.com/office/mac/drawingml/2011/main" xmlns="" val="1"/>
               </a:ext>
             </a:extLst>
           </p:spPr>
@@ -15656,7 +15668,7 @@
             </a:ln>
             <a:extLst>
               <a:ext uri="{C572A759-6A51-4108-AA02-DFA0A04FC94B}">
-                <ma14:wrappingTextBoxFlag xmlns="" xmlns:ma14="http://schemas.microsoft.com/office/mac/drawingml/2011/main" val="1"/>
+                <ma14:wrappingTextBoxFlag xmlns:ma14="http://schemas.microsoft.com/office/mac/drawingml/2011/main" xmlns="" val="1"/>
               </a:ext>
             </a:extLst>
           </p:spPr>
@@ -15927,7 +15939,7 @@
               </a:ln>
               <a:extLst>
                 <a:ext uri="{C572A759-6A51-4108-AA02-DFA0A04FC94B}">
-                  <ma14:wrappingTextBoxFlag xmlns="" xmlns:ma14="http://schemas.microsoft.com/office/mac/drawingml/2011/main" val="1"/>
+                  <ma14:wrappingTextBoxFlag xmlns:ma14="http://schemas.microsoft.com/office/mac/drawingml/2011/main" xmlns="" val="1"/>
                 </a:ext>
               </a:extLst>
             </p:spPr>
@@ -16718,7 +16730,7 @@
           </a:ln>
           <a:extLst>
             <a:ext uri="{C572A759-6A51-4108-AA02-DFA0A04FC94B}">
-              <ma14:wrappingTextBoxFlag xmlns="" xmlns:ma14="http://schemas.microsoft.com/office/mac/drawingml/2011/main" val="1"/>
+              <ma14:wrappingTextBoxFlag xmlns:ma14="http://schemas.microsoft.com/office/mac/drawingml/2011/main" xmlns="" val="1"/>
             </a:ext>
           </a:extLst>
         </p:spPr>
@@ -17829,8 +17841,8 @@
           </a:p>
         </p:txBody>
       </p:sp>
-      <mc:AlternateContent xmlns:mc="http://schemas.openxmlformats.org/markup-compatibility/2006">
-        <mc:Choice xmlns:a14="http://schemas.microsoft.com/office/drawing/2010/main" Requires="a14">
+      <mc:AlternateContent xmlns:mc="http://schemas.openxmlformats.org/markup-compatibility/2006" xmlns:a14="http://schemas.microsoft.com/office/drawing/2010/main">
+        <mc:Choice Requires="a14">
           <p:sp>
             <p:nvSpPr>
               <p:cNvPr id="3" name="Content Placeholder 2"/>
@@ -17903,7 +17915,7 @@
             </p:txBody>
           </p:sp>
         </mc:Choice>
-        <mc:Fallback>
+        <mc:Fallback xmlns="">
           <p:sp>
             <p:nvSpPr>
               <p:cNvPr id="3" name="Content Placeholder 2"/>
@@ -18036,8 +18048,8 @@
           </a:p>
         </p:txBody>
       </p:sp>
-      <mc:AlternateContent xmlns:mc="http://schemas.openxmlformats.org/markup-compatibility/2006">
-        <mc:Choice xmlns:a14="http://schemas.microsoft.com/office/drawing/2010/main" Requires="a14">
+      <mc:AlternateContent xmlns:mc="http://schemas.openxmlformats.org/markup-compatibility/2006" xmlns:a14="http://schemas.microsoft.com/office/drawing/2010/main">
+        <mc:Choice Requires="a14">
           <p:sp>
             <p:nvSpPr>
               <p:cNvPr id="3" name="Content Placeholder 2">
@@ -18287,7 +18299,7 @@
             </p:txBody>
           </p:sp>
         </mc:Choice>
-        <mc:Fallback>
+        <mc:Fallback xmlns="">
           <p:sp>
             <p:nvSpPr>
               <p:cNvPr id="3" name="Content Placeholder 2">
@@ -18779,7 +18791,7 @@
               </a:ln>
               <a:extLst>
                 <a:ext uri="{C572A759-6A51-4108-AA02-DFA0A04FC94B}">
-                  <ma14:wrappingTextBoxFlag xmlns="" xmlns:ma14="http://schemas.microsoft.com/office/mac/drawingml/2011/main" val="1"/>
+                  <ma14:wrappingTextBoxFlag xmlns:ma14="http://schemas.microsoft.com/office/mac/drawingml/2011/main" xmlns="" val="1"/>
                 </a:ext>
               </a:extLst>
             </p:spPr>
@@ -18927,7 +18939,7 @@
           </a:ln>
           <a:extLst>
             <a:ext uri="{C572A759-6A51-4108-AA02-DFA0A04FC94B}">
-              <ma14:wrappingTextBoxFlag xmlns="" xmlns:ma14="http://schemas.microsoft.com/office/mac/drawingml/2011/main" val="1"/>
+              <ma14:wrappingTextBoxFlag xmlns:ma14="http://schemas.microsoft.com/office/mac/drawingml/2011/main" xmlns="" val="1"/>
             </a:ext>
           </a:extLst>
         </p:spPr>
@@ -19042,8 +19054,8 @@
           </a:ln>
         </p:spPr>
       </p:pic>
-      <mc:AlternateContent xmlns:mc="http://schemas.openxmlformats.org/markup-compatibility/2006">
-        <mc:Choice xmlns:a14="http://schemas.microsoft.com/office/drawing/2010/main" Requires="a14">
+      <mc:AlternateContent xmlns:mc="http://schemas.openxmlformats.org/markup-compatibility/2006" xmlns:a14="http://schemas.microsoft.com/office/drawing/2010/main">
+        <mc:Choice Requires="a14">
           <p:sp>
             <p:nvSpPr>
               <p:cNvPr id="15" name="image coordinate system">
@@ -19069,7 +19081,7 @@
               </a:ln>
               <a:extLst>
                 <a:ext uri="{C572A759-6A51-4108-AA02-DFA0A04FC94B}">
-                  <ma14:wrappingTextBoxFlag xmlns="" xmlns:ma14="http://schemas.microsoft.com/office/mac/drawingml/2011/main" val="1"/>
+                  <ma14:wrappingTextBoxFlag xmlns:ma14="http://schemas.microsoft.com/office/mac/drawingml/2011/main" xmlns="" val="1"/>
                 </a:ext>
               </a:extLst>
             </p:spPr>
@@ -19173,7 +19185,7 @@
             </p:txBody>
           </p:sp>
         </mc:Choice>
-        <mc:Fallback>
+        <mc:Fallback xmlns="">
           <p:sp>
             <p:nvSpPr>
               <p:cNvPr id="15" name="image coordinate system">
@@ -19675,7 +19687,7 @@
               </a:ln>
               <a:extLst>
                 <a:ext uri="{C572A759-6A51-4108-AA02-DFA0A04FC94B}">
-                  <ma14:wrappingTextBoxFlag xmlns="" xmlns:ma14="http://schemas.microsoft.com/office/mac/drawingml/2011/main" val="1"/>
+                  <ma14:wrappingTextBoxFlag xmlns:ma14="http://schemas.microsoft.com/office/mac/drawingml/2011/main" xmlns="" val="1"/>
                 </a:ext>
               </a:extLst>
             </p:spPr>
@@ -19823,7 +19835,7 @@
           </a:ln>
           <a:extLst>
             <a:ext uri="{C572A759-6A51-4108-AA02-DFA0A04FC94B}">
-              <ma14:wrappingTextBoxFlag xmlns="" xmlns:ma14="http://schemas.microsoft.com/office/mac/drawingml/2011/main" val="1"/>
+              <ma14:wrappingTextBoxFlag xmlns:ma14="http://schemas.microsoft.com/office/mac/drawingml/2011/main" xmlns="" val="1"/>
             </a:ext>
           </a:extLst>
         </p:spPr>
@@ -19938,8 +19950,8 @@
           </a:ln>
         </p:spPr>
       </p:pic>
-      <mc:AlternateContent xmlns:mc="http://schemas.openxmlformats.org/markup-compatibility/2006">
-        <mc:Choice xmlns:a14="http://schemas.microsoft.com/office/drawing/2010/main" Requires="a14">
+      <mc:AlternateContent xmlns:mc="http://schemas.openxmlformats.org/markup-compatibility/2006" xmlns:a14="http://schemas.microsoft.com/office/drawing/2010/main">
+        <mc:Choice Requires="a14">
           <p:sp>
             <p:nvSpPr>
               <p:cNvPr id="25" name="image coordinate system">
@@ -19965,7 +19977,7 @@
               </a:ln>
               <a:extLst>
                 <a:ext uri="{C572A759-6A51-4108-AA02-DFA0A04FC94B}">
-                  <ma14:wrappingTextBoxFlag xmlns="" xmlns:ma14="http://schemas.microsoft.com/office/mac/drawingml/2011/main" val="1"/>
+                  <ma14:wrappingTextBoxFlag xmlns:ma14="http://schemas.microsoft.com/office/mac/drawingml/2011/main" xmlns="" val="1"/>
                 </a:ext>
               </a:extLst>
             </p:spPr>
@@ -20069,7 +20081,7 @@
             </p:txBody>
           </p:sp>
         </mc:Choice>
-        <mc:Fallback>
+        <mc:Fallback xmlns="">
           <p:sp>
             <p:nvSpPr>
               <p:cNvPr id="25" name="image coordinate system">
@@ -21409,7 +21421,7 @@
           </a:ln>
           <a:extLst>
             <a:ext uri="{C572A759-6A51-4108-AA02-DFA0A04FC94B}">
-              <ma14:wrappingTextBoxFlag xmlns:ma14="http://schemas.microsoft.com/office/mac/drawingml/2011/main" xmlns="" val="1"/>
+              <ma14:wrappingTextBoxFlag xmlns="" xmlns:ma14="http://schemas.microsoft.com/office/mac/drawingml/2011/main" val="1"/>
             </a:ext>
           </a:extLst>
         </p:spPr>
@@ -21464,7 +21476,7 @@
           </a:ln>
           <a:extLst>
             <a:ext uri="{C572A759-6A51-4108-AA02-DFA0A04FC94B}">
-              <ma14:wrappingTextBoxFlag xmlns:ma14="http://schemas.microsoft.com/office/mac/drawingml/2011/main" xmlns="" val="1"/>
+              <ma14:wrappingTextBoxFlag xmlns="" xmlns:ma14="http://schemas.microsoft.com/office/mac/drawingml/2011/main" val="1"/>
             </a:ext>
           </a:extLst>
         </p:spPr>
@@ -21667,7 +21679,7 @@
           </a:ln>
           <a:extLst>
             <a:ext uri="{C572A759-6A51-4108-AA02-DFA0A04FC94B}">
-              <ma14:wrappingTextBoxFlag xmlns:ma14="http://schemas.microsoft.com/office/mac/drawingml/2011/main" xmlns="" val="1"/>
+              <ma14:wrappingTextBoxFlag xmlns="" xmlns:ma14="http://schemas.microsoft.com/office/mac/drawingml/2011/main" val="1"/>
             </a:ext>
           </a:extLst>
         </p:spPr>
@@ -21712,7 +21724,7 @@
           </a:ln>
           <a:extLst>
             <a:ext uri="{C572A759-6A51-4108-AA02-DFA0A04FC94B}">
-              <ma14:wrappingTextBoxFlag xmlns:ma14="http://schemas.microsoft.com/office/mac/drawingml/2011/main" xmlns="" val="1"/>
+              <ma14:wrappingTextBoxFlag xmlns="" xmlns:ma14="http://schemas.microsoft.com/office/mac/drawingml/2011/main" val="1"/>
             </a:ext>
           </a:extLst>
         </p:spPr>
@@ -21977,7 +21989,7 @@
           </a:ln>
           <a:extLst>
             <a:ext uri="{C572A759-6A51-4108-AA02-DFA0A04FC94B}">
-              <ma14:wrappingTextBoxFlag xmlns:ma14="http://schemas.microsoft.com/office/mac/drawingml/2011/main" xmlns="" val="1"/>
+              <ma14:wrappingTextBoxFlag xmlns="" xmlns:ma14="http://schemas.microsoft.com/office/mac/drawingml/2011/main" val="1"/>
             </a:ext>
           </a:extLst>
         </p:spPr>
@@ -22160,7 +22172,7 @@
           </a:ln>
           <a:extLst>
             <a:ext uri="{C572A759-6A51-4108-AA02-DFA0A04FC94B}">
-              <ma14:wrappingTextBoxFlag xmlns:ma14="http://schemas.microsoft.com/office/mac/drawingml/2011/main" xmlns="" val="1"/>
+              <ma14:wrappingTextBoxFlag xmlns="" xmlns:ma14="http://schemas.microsoft.com/office/mac/drawingml/2011/main" val="1"/>
             </a:ext>
           </a:extLst>
         </p:spPr>
@@ -22383,7 +22395,7 @@
           </a:ln>
           <a:extLst>
             <a:ext uri="{C572A759-6A51-4108-AA02-DFA0A04FC94B}">
-              <ma14:wrappingTextBoxFlag xmlns:ma14="http://schemas.microsoft.com/office/mac/drawingml/2011/main" xmlns="" val="1"/>
+              <ma14:wrappingTextBoxFlag xmlns="" xmlns:ma14="http://schemas.microsoft.com/office/mac/drawingml/2011/main" val="1"/>
             </a:ext>
           </a:extLst>
         </p:spPr>
@@ -22461,7 +22473,7 @@
           </a:ln>
           <a:extLst>
             <a:ext uri="{C572A759-6A51-4108-AA02-DFA0A04FC94B}">
-              <ma14:wrappingTextBoxFlag xmlns:ma14="http://schemas.microsoft.com/office/mac/drawingml/2011/main" xmlns="" val="1"/>
+              <ma14:wrappingTextBoxFlag xmlns="" xmlns:ma14="http://schemas.microsoft.com/office/mac/drawingml/2011/main" val="1"/>
             </a:ext>
           </a:extLst>
         </p:spPr>
@@ -22570,7 +22582,7 @@
           </a:ln>
           <a:extLst>
             <a:ext uri="{C572A759-6A51-4108-AA02-DFA0A04FC94B}">
-              <ma14:wrappingTextBoxFlag xmlns:ma14="http://schemas.microsoft.com/office/mac/drawingml/2011/main" xmlns="" val="1"/>
+              <ma14:wrappingTextBoxFlag xmlns="" xmlns:ma14="http://schemas.microsoft.com/office/mac/drawingml/2011/main" val="1"/>
             </a:ext>
           </a:extLst>
         </p:spPr>
@@ -22636,7 +22648,7 @@
           </a:ln>
           <a:extLst>
             <a:ext uri="{C572A759-6A51-4108-AA02-DFA0A04FC94B}">
-              <ma14:wrappingTextBoxFlag xmlns:ma14="http://schemas.microsoft.com/office/mac/drawingml/2011/main" xmlns="" val="1"/>
+              <ma14:wrappingTextBoxFlag xmlns="" xmlns:ma14="http://schemas.microsoft.com/office/mac/drawingml/2011/main" val="1"/>
             </a:ext>
           </a:extLst>
         </p:spPr>
@@ -22816,8 +22828,8 @@
           </a:p>
         </p:txBody>
       </p:sp>
-      <mc:AlternateContent xmlns:mc="http://schemas.openxmlformats.org/markup-compatibility/2006">
-        <mc:Choice xmlns:a14="http://schemas.microsoft.com/office/drawing/2010/main" Requires="a14">
+      <mc:AlternateContent xmlns:mc="http://schemas.openxmlformats.org/markup-compatibility/2006" xmlns:a14="http://schemas.microsoft.com/office/drawing/2010/main">
+        <mc:Choice Requires="a14">
           <p:sp>
             <p:nvSpPr>
               <p:cNvPr id="8" name="Content Placeholder 2"/>
@@ -23089,7 +23101,7 @@
             </p:txBody>
           </p:sp>
         </mc:Choice>
-        <mc:Fallback>
+        <mc:Fallback xmlns="">
           <p:sp>
             <p:nvSpPr>
               <p:cNvPr id="8" name="Content Placeholder 2"/>
@@ -29787,7 +29799,7 @@
           </a:ln>
           <a:extLst>
             <a:ext uri="{C572A759-6A51-4108-AA02-DFA0A04FC94B}">
-              <ma14:wrappingTextBoxFlag xmlns="" xmlns:ma14="http://schemas.microsoft.com/office/mac/drawingml/2011/main" val="1"/>
+              <ma14:wrappingTextBoxFlag xmlns:ma14="http://schemas.microsoft.com/office/mac/drawingml/2011/main" xmlns="" val="1"/>
             </a:ext>
           </a:extLst>
         </p:spPr>
@@ -30095,7 +30107,7 @@
           </a:ln>
           <a:extLst>
             <a:ext uri="{C572A759-6A51-4108-AA02-DFA0A04FC94B}">
-              <ma14:wrappingTextBoxFlag xmlns="" xmlns:ma14="http://schemas.microsoft.com/office/mac/drawingml/2011/main" val="1"/>
+              <ma14:wrappingTextBoxFlag xmlns:ma14="http://schemas.microsoft.com/office/mac/drawingml/2011/main" xmlns="" val="1"/>
             </a:ext>
           </a:extLst>
         </p:spPr>
@@ -30279,8 +30291,8 @@
           </a:p>
         </p:txBody>
       </p:sp>
-      <mc:AlternateContent xmlns:mc="http://schemas.openxmlformats.org/markup-compatibility/2006">
-        <mc:Choice xmlns:a14="http://schemas.microsoft.com/office/drawing/2010/main" Requires="a14">
+      <mc:AlternateContent xmlns:mc="http://schemas.openxmlformats.org/markup-compatibility/2006" xmlns:a14="http://schemas.microsoft.com/office/drawing/2010/main">
+        <mc:Choice Requires="a14">
           <p:sp>
             <p:nvSpPr>
               <p:cNvPr id="28" name="image coordinate system">
@@ -30306,7 +30318,7 @@
               </a:ln>
               <a:extLst>
                 <a:ext uri="{C572A759-6A51-4108-AA02-DFA0A04FC94B}">
-                  <ma14:wrappingTextBoxFlag xmlns="" xmlns:ma14="http://schemas.microsoft.com/office/mac/drawingml/2011/main" val="1"/>
+                  <ma14:wrappingTextBoxFlag xmlns:ma14="http://schemas.microsoft.com/office/mac/drawingml/2011/main" xmlns="" val="1"/>
                 </a:ext>
               </a:extLst>
             </p:spPr>
@@ -30394,7 +30406,7 @@
             </p:txBody>
           </p:sp>
         </mc:Choice>
-        <mc:Fallback>
+        <mc:Fallback xmlns="">
           <p:sp>
             <p:nvSpPr>
               <p:cNvPr id="28" name="image coordinate system">
@@ -30474,7 +30486,7 @@
               </a:ln>
               <a:extLst>
                 <a:ext uri="{C572A759-6A51-4108-AA02-DFA0A04FC94B}">
-                  <ma14:wrappingTextBoxFlag xmlns="" xmlns:ma14="http://schemas.microsoft.com/office/mac/drawingml/2011/main" val="1"/>
+                  <ma14:wrappingTextBoxFlag xmlns:ma14="http://schemas.microsoft.com/office/mac/drawingml/2011/main" xmlns="" val="1"/>
                 </a:ext>
               </a:extLst>
             </p:spPr>
@@ -30624,7 +30636,7 @@
               </a:ln>
               <a:extLst>
                 <a:ext uri="{C572A759-6A51-4108-AA02-DFA0A04FC94B}">
-                  <ma14:wrappingTextBoxFlag xmlns="" xmlns:ma14="http://schemas.microsoft.com/office/mac/drawingml/2011/main" val="1"/>
+                  <ma14:wrappingTextBoxFlag xmlns:ma14="http://schemas.microsoft.com/office/mac/drawingml/2011/main" xmlns="" val="1"/>
                 </a:ext>
               </a:extLst>
             </p:spPr>
@@ -30774,7 +30786,7 @@
               </a:ln>
               <a:extLst>
                 <a:ext uri="{C572A759-6A51-4108-AA02-DFA0A04FC94B}">
-                  <ma14:wrappingTextBoxFlag xmlns="" xmlns:ma14="http://schemas.microsoft.com/office/mac/drawingml/2011/main" val="1"/>
+                  <ma14:wrappingTextBoxFlag xmlns:ma14="http://schemas.microsoft.com/office/mac/drawingml/2011/main" xmlns="" val="1"/>
                 </a:ext>
               </a:extLst>
             </p:spPr>

</xml_diff>